<commit_message>
migração do repositório da bandtec
</commit_message>
<xml_diff>
--- a/documentacao/Status Report/Status Report - Grupo 09.pptx
+++ b/documentacao/Status Report/Status Report - Grupo 09.pptx
@@ -7,15 +7,16 @@
     <p:sldMasterId id="2147483665" r:id="rId6"/>
   </p:sldMasterIdLst>
   <p:notesMasterIdLst>
-    <p:notesMasterId r:id="rId10"/>
+    <p:notesMasterId r:id="rId11"/>
   </p:notesMasterIdLst>
   <p:handoutMasterIdLst>
-    <p:handoutMasterId r:id="rId11"/>
+    <p:handoutMasterId r:id="rId12"/>
   </p:handoutMasterIdLst>
   <p:sldIdLst>
     <p:sldId id="344" r:id="rId7"/>
     <p:sldId id="471" r:id="rId8"/>
     <p:sldId id="472" r:id="rId9"/>
+    <p:sldId id="473" r:id="rId10"/>
   </p:sldIdLst>
   <p:sldSz cx="13442950" cy="7561263"/>
   <p:notesSz cx="7104063" cy="10234613"/>
@@ -125,6 +126,7 @@
             <p14:sldId id="344"/>
             <p14:sldId id="471"/>
             <p14:sldId id="472"/>
+            <p14:sldId id="473"/>
           </p14:sldIdLst>
         </p14:section>
       </p14:sectionLst>
@@ -423,7 +425,7 @@
             <a:fld id="{C3CD65D1-5C11-455D-9F9A-0E035F00A0DA}" type="datetimeFigureOut">
               <a:rPr lang="pt-BR" smtClean="0"/>
               <a:pPr/>
-              <a:t>24/08/2021</a:t>
+              <a:t>31/08/2021</a:t>
             </a:fld>
             <a:endParaRPr lang="pt-BR"/>
           </a:p>
@@ -591,7 +593,7 @@
             <a:fld id="{A05DA3EF-18EA-43DE-B1BB-402A3C558822}" type="datetimeFigureOut">
               <a:rPr lang="pt-BR" smtClean="0"/>
               <a:pPr/>
-              <a:t>24/08/2021</a:t>
+              <a:t>31/08/2021</a:t>
             </a:fld>
             <a:endParaRPr lang="pt-BR"/>
           </a:p>
@@ -1124,6 +1126,99 @@
     <p:extLst>
       <p:ext uri="{BB962C8B-B14F-4D97-AF65-F5344CB8AC3E}">
         <p14:creationId xmlns:p14="http://schemas.microsoft.com/office/powerpoint/2010/main" val="1939168639"/>
+      </p:ext>
+    </p:extLst>
+  </p:cSld>
+  <p:clrMapOvr>
+    <a:masterClrMapping/>
+  </p:clrMapOvr>
+</p:notes>
+</file>
+
+<file path=ppt/notesSlides/notesSlide4.xml><?xml version="1.0" encoding="utf-8"?>
+<p:notes xmlns:a="http://schemas.openxmlformats.org/drawingml/2006/main" xmlns:r="http://schemas.openxmlformats.org/officeDocument/2006/relationships" xmlns:p="http://schemas.openxmlformats.org/presentationml/2006/main">
+  <p:cSld>
+    <p:spTree>
+      <p:nvGrpSpPr>
+        <p:cNvPr id="1" name=""/>
+        <p:cNvGrpSpPr/>
+        <p:nvPr/>
+      </p:nvGrpSpPr>
+      <p:grpSpPr>
+        <a:xfrm>
+          <a:off x="0" y="0"/>
+          <a:ext cx="0" cy="0"/>
+          <a:chOff x="0" y="0"/>
+          <a:chExt cx="0" cy="0"/>
+        </a:xfrm>
+      </p:grpSpPr>
+      <p:sp>
+        <p:nvSpPr>
+          <p:cNvPr id="2" name="Slide Image Placeholder 1"/>
+          <p:cNvSpPr>
+            <a:spLocks noGrp="1" noRot="1" noChangeAspect="1"/>
+          </p:cNvSpPr>
+          <p:nvPr>
+            <p:ph type="sldImg"/>
+          </p:nvPr>
+        </p:nvSpPr>
+        <p:spPr/>
+      </p:sp>
+      <p:sp>
+        <p:nvSpPr>
+          <p:cNvPr id="3" name="Notes Placeholder 2"/>
+          <p:cNvSpPr>
+            <a:spLocks noGrp="1"/>
+          </p:cNvSpPr>
+          <p:nvPr>
+            <p:ph type="body" idx="1"/>
+          </p:nvPr>
+        </p:nvSpPr>
+        <p:spPr/>
+        <p:txBody>
+          <a:bodyPr/>
+          <a:lstStyle/>
+          <a:p>
+            <a:endParaRPr lang="en-US"/>
+          </a:p>
+        </p:txBody>
+      </p:sp>
+      <p:sp>
+        <p:nvSpPr>
+          <p:cNvPr id="4" name="Slide Number Placeholder 3"/>
+          <p:cNvSpPr>
+            <a:spLocks noGrp="1"/>
+          </p:cNvSpPr>
+          <p:nvPr>
+            <p:ph type="sldNum" sz="quarter" idx="10"/>
+          </p:nvPr>
+        </p:nvSpPr>
+        <p:spPr/>
+        <p:txBody>
+          <a:bodyPr/>
+          <a:lstStyle/>
+          <a:p>
+            <a:fld id="{B39AF3DB-B6A1-2444-9DD8-53D016F8E638}" type="slidenum">
+              <a:rPr lang="pt-BR" smtClean="0">
+                <a:solidFill>
+                  <a:prstClr val="black"/>
+                </a:solidFill>
+              </a:rPr>
+              <a:pPr/>
+              <a:t>4</a:t>
+            </a:fld>
+            <a:endParaRPr lang="pt-BR">
+              <a:solidFill>
+                <a:prstClr val="black"/>
+              </a:solidFill>
+            </a:endParaRPr>
+          </a:p>
+        </p:txBody>
+      </p:sp>
+    </p:spTree>
+    <p:extLst>
+      <p:ext uri="{BB962C8B-B14F-4D97-AF65-F5344CB8AC3E}">
+        <p14:creationId xmlns:p14="http://schemas.microsoft.com/office/powerpoint/2010/main" val="1003484623"/>
       </p:ext>
     </p:extLst>
   </p:cSld>
@@ -25089,6 +25184,2208 @@
     <p:extLst>
       <p:ext uri="{BB962C8B-B14F-4D97-AF65-F5344CB8AC3E}">
         <p14:creationId xmlns:p14="http://schemas.microsoft.com/office/powerpoint/2010/main" val="3397796063"/>
+      </p:ext>
+    </p:extLst>
+  </p:cSld>
+  <p:clrMapOvr>
+    <a:masterClrMapping/>
+  </p:clrMapOvr>
+</p:sld>
+</file>
+
+<file path=ppt/slides/slide4.xml><?xml version="1.0" encoding="utf-8"?>
+<p:sld xmlns:a="http://schemas.openxmlformats.org/drawingml/2006/main" xmlns:r="http://schemas.openxmlformats.org/officeDocument/2006/relationships" xmlns:p="http://schemas.openxmlformats.org/presentationml/2006/main">
+  <p:cSld>
+    <p:spTree>
+      <p:nvGrpSpPr>
+        <p:cNvPr id="1" name=""/>
+        <p:cNvGrpSpPr/>
+        <p:nvPr/>
+      </p:nvGrpSpPr>
+      <p:grpSpPr>
+        <a:xfrm>
+          <a:off x="0" y="0"/>
+          <a:ext cx="0" cy="0"/>
+          <a:chOff x="0" y="0"/>
+          <a:chExt cx="0" cy="0"/>
+        </a:xfrm>
+      </p:grpSpPr>
+      <p:sp>
+        <p:nvSpPr>
+          <p:cNvPr id="43" name="Rectangle 42"/>
+          <p:cNvSpPr/>
+          <p:nvPr/>
+        </p:nvSpPr>
+        <p:spPr>
+          <a:xfrm>
+            <a:off x="6804883" y="1106495"/>
+            <a:ext cx="6209639" cy="2235805"/>
+          </a:xfrm>
+          <a:prstGeom prst="rect">
+            <a:avLst/>
+          </a:prstGeom>
+          <a:noFill/>
+          <a:ln w="12700">
+            <a:solidFill>
+              <a:schemeClr val="bg1">
+                <a:lumMod val="50000"/>
+              </a:schemeClr>
+            </a:solidFill>
+          </a:ln>
+        </p:spPr>
+        <p:style>
+          <a:lnRef idx="2">
+            <a:schemeClr val="accent4"/>
+          </a:lnRef>
+          <a:fillRef idx="1">
+            <a:schemeClr val="lt1"/>
+          </a:fillRef>
+          <a:effectRef idx="0">
+            <a:schemeClr val="accent4"/>
+          </a:effectRef>
+          <a:fontRef idx="minor">
+            <a:schemeClr val="dk1"/>
+          </a:fontRef>
+        </p:style>
+        <p:txBody>
+          <a:bodyPr tIns="105844" rtlCol="0" anchor="t"/>
+          <a:lstStyle/>
+          <a:p>
+            <a:pPr defTabSz="672130">
+              <a:spcAft>
+                <a:spcPts val="882"/>
+              </a:spcAft>
+            </a:pPr>
+            <a:endParaRPr lang="pt-BR" sz="1470" dirty="0">
+              <a:solidFill>
+                <a:schemeClr val="tx1"/>
+              </a:solidFill>
+              <a:latin typeface="Exo 2 Medium" panose="00000600000000000000" pitchFamily="50" charset="0"/>
+              <a:cs typeface="Simplon BP Regular"/>
+            </a:endParaRPr>
+          </a:p>
+        </p:txBody>
+      </p:sp>
+      <p:sp>
+        <p:nvSpPr>
+          <p:cNvPr id="3" name="Title 2"/>
+          <p:cNvSpPr>
+            <a:spLocks noGrp="1"/>
+          </p:cNvSpPr>
+          <p:nvPr>
+            <p:ph type="title"/>
+          </p:nvPr>
+        </p:nvSpPr>
+        <p:spPr>
+          <a:xfrm>
+            <a:off x="469692" y="185232"/>
+            <a:ext cx="12098020" cy="800352"/>
+          </a:xfrm>
+        </p:spPr>
+        <p:txBody>
+          <a:bodyPr vert="horz" wrap="square" lIns="105844" tIns="0" rIns="105844" bIns="0" numCol="1" anchor="t" anchorCtr="0" compatLnSpc="1">
+            <a:prstTxWarp prst="textNoShape">
+              <a:avLst/>
+            </a:prstTxWarp>
+            <a:noAutofit/>
+          </a:bodyPr>
+          <a:lstStyle/>
+          <a:p>
+            <a:pPr algn="l">
+              <a:spcAft>
+                <a:spcPts val="882"/>
+              </a:spcAft>
+            </a:pPr>
+            <a:r>
+              <a:rPr lang="en-US" sz="2646" dirty="0">
+                <a:solidFill>
+                  <a:prstClr val="black"/>
+                </a:solidFill>
+                <a:latin typeface="Exo 2 Medium" panose="00000600000000000000" pitchFamily="50" charset="0"/>
+                <a:cs typeface="Simplon Oi Headline"/>
+              </a:rPr>
+              <a:t>SEMANA 3 - 31/08/2021</a:t>
+            </a:r>
+          </a:p>
+        </p:txBody>
+      </p:sp>
+      <p:sp>
+        <p:nvSpPr>
+          <p:cNvPr id="78" name="TextBox 118"/>
+          <p:cNvSpPr txBox="1"/>
+          <p:nvPr/>
+        </p:nvSpPr>
+        <p:spPr>
+          <a:xfrm>
+            <a:off x="11822773" y="576471"/>
+            <a:ext cx="899678" cy="179824"/>
+          </a:xfrm>
+          <a:prstGeom prst="rect">
+            <a:avLst/>
+          </a:prstGeom>
+          <a:noFill/>
+          <a:ln w="12700">
+            <a:noFill/>
+          </a:ln>
+        </p:spPr>
+        <p:style>
+          <a:lnRef idx="2">
+            <a:schemeClr val="accent4"/>
+          </a:lnRef>
+          <a:fillRef idx="1">
+            <a:schemeClr val="lt1"/>
+          </a:fillRef>
+          <a:effectRef idx="0">
+            <a:schemeClr val="accent4"/>
+          </a:effectRef>
+          <a:fontRef idx="minor">
+            <a:schemeClr val="dk1"/>
+          </a:fontRef>
+        </p:style>
+        <p:txBody>
+          <a:bodyPr wrap="none" lIns="52922" tIns="52922" rIns="52922" bIns="0" rtlCol="0" anchor="b"/>
+          <a:lstStyle>
+            <a:defPPr>
+              <a:defRPr lang="en-US"/>
+            </a:defPPr>
+            <a:lvl1pPr algn="ctr">
+              <a:defRPr sz="1000" b="1">
+                <a:latin typeface="Simplon BP Regular"/>
+                <a:cs typeface="Simplon BP Regular"/>
+              </a:defRPr>
+            </a:lvl1pPr>
+            <a:lvl2pPr>
+              <a:defRPr>
+                <a:solidFill>
+                  <a:schemeClr val="dk1"/>
+                </a:solidFill>
+              </a:defRPr>
+            </a:lvl2pPr>
+            <a:lvl3pPr>
+              <a:defRPr>
+                <a:solidFill>
+                  <a:schemeClr val="dk1"/>
+                </a:solidFill>
+              </a:defRPr>
+            </a:lvl3pPr>
+            <a:lvl4pPr>
+              <a:defRPr>
+                <a:solidFill>
+                  <a:schemeClr val="dk1"/>
+                </a:solidFill>
+              </a:defRPr>
+            </a:lvl4pPr>
+            <a:lvl5pPr>
+              <a:defRPr>
+                <a:solidFill>
+                  <a:schemeClr val="dk1"/>
+                </a:solidFill>
+              </a:defRPr>
+            </a:lvl5pPr>
+            <a:lvl6pPr>
+              <a:defRPr>
+                <a:solidFill>
+                  <a:schemeClr val="dk1"/>
+                </a:solidFill>
+              </a:defRPr>
+            </a:lvl6pPr>
+            <a:lvl7pPr>
+              <a:defRPr>
+                <a:solidFill>
+                  <a:schemeClr val="dk1"/>
+                </a:solidFill>
+              </a:defRPr>
+            </a:lvl7pPr>
+            <a:lvl8pPr>
+              <a:defRPr>
+                <a:solidFill>
+                  <a:schemeClr val="dk1"/>
+                </a:solidFill>
+              </a:defRPr>
+            </a:lvl8pPr>
+            <a:lvl9pPr>
+              <a:defRPr>
+                <a:solidFill>
+                  <a:schemeClr val="dk1"/>
+                </a:solidFill>
+              </a:defRPr>
+            </a:lvl9pPr>
+          </a:lstStyle>
+          <a:p>
+            <a:pPr defTabSz="672130"/>
+            <a:r>
+              <a:rPr lang="pt-BR" sz="1176" b="0" dirty="0">
+                <a:solidFill>
+                  <a:prstClr val="black"/>
+                </a:solidFill>
+                <a:latin typeface="Exo 2 Medium" panose="00000600000000000000" pitchFamily="50" charset="0"/>
+              </a:rPr>
+              <a:t>Negócios</a:t>
+            </a:r>
+          </a:p>
+        </p:txBody>
+      </p:sp>
+      <p:sp>
+        <p:nvSpPr>
+          <p:cNvPr id="109" name="Oval 120"/>
+          <p:cNvSpPr>
+            <a:spLocks noChangeAspect="1"/>
+          </p:cNvSpPr>
+          <p:nvPr/>
+        </p:nvSpPr>
+        <p:spPr>
+          <a:xfrm>
+            <a:off x="11193898" y="297930"/>
+            <a:ext cx="211404" cy="211689"/>
+          </a:xfrm>
+          <a:prstGeom prst="ellipse">
+            <a:avLst/>
+          </a:prstGeom>
+          <a:solidFill>
+            <a:srgbClr val="1BCF13"/>
+          </a:solidFill>
+          <a:ln w="12700">
+            <a:solidFill>
+              <a:schemeClr val="accent3"/>
+            </a:solidFill>
+          </a:ln>
+        </p:spPr>
+        <p:style>
+          <a:lnRef idx="2">
+            <a:schemeClr val="accent1">
+              <a:shade val="50000"/>
+            </a:schemeClr>
+          </a:lnRef>
+          <a:fillRef idx="1">
+            <a:schemeClr val="accent1"/>
+          </a:fillRef>
+          <a:effectRef idx="0">
+            <a:schemeClr val="accent1"/>
+          </a:effectRef>
+          <a:fontRef idx="minor">
+            <a:schemeClr val="lt1"/>
+          </a:fontRef>
+        </p:style>
+        <p:txBody>
+          <a:bodyPr wrap="none" lIns="52922" tIns="52922" rIns="52922" rtlCol="0" anchor="ctr"/>
+          <a:lstStyle/>
+          <a:p>
+            <a:pPr algn="ctr" defTabSz="672130"/>
+            <a:endParaRPr lang="en-US" sz="1176" dirty="0">
+              <a:solidFill>
+                <a:prstClr val="black"/>
+              </a:solidFill>
+              <a:latin typeface="Exo 2 Medium" panose="00000600000000000000" pitchFamily="50" charset="0"/>
+              <a:cs typeface="Simplon BP Regular"/>
+            </a:endParaRPr>
+          </a:p>
+        </p:txBody>
+      </p:sp>
+      <p:sp>
+        <p:nvSpPr>
+          <p:cNvPr id="80" name="TextBox 123"/>
+          <p:cNvSpPr txBox="1"/>
+          <p:nvPr/>
+        </p:nvSpPr>
+        <p:spPr>
+          <a:xfrm>
+            <a:off x="10852497" y="576471"/>
+            <a:ext cx="899678" cy="179824"/>
+          </a:xfrm>
+          <a:prstGeom prst="rect">
+            <a:avLst/>
+          </a:prstGeom>
+          <a:noFill/>
+          <a:ln w="12700">
+            <a:noFill/>
+          </a:ln>
+        </p:spPr>
+        <p:style>
+          <a:lnRef idx="2">
+            <a:schemeClr val="accent4"/>
+          </a:lnRef>
+          <a:fillRef idx="1">
+            <a:schemeClr val="lt1"/>
+          </a:fillRef>
+          <a:effectRef idx="0">
+            <a:schemeClr val="accent4"/>
+          </a:effectRef>
+          <a:fontRef idx="minor">
+            <a:schemeClr val="dk1"/>
+          </a:fontRef>
+        </p:style>
+        <p:txBody>
+          <a:bodyPr wrap="none" lIns="52922" tIns="52922" rIns="52922" bIns="0" rtlCol="0" anchor="b"/>
+          <a:lstStyle>
+            <a:defPPr>
+              <a:defRPr lang="en-US"/>
+            </a:defPPr>
+            <a:lvl1pPr algn="ctr">
+              <a:defRPr sz="1000" b="1">
+                <a:latin typeface="Simplon BP Regular"/>
+                <a:cs typeface="Simplon BP Regular"/>
+              </a:defRPr>
+            </a:lvl1pPr>
+            <a:lvl2pPr>
+              <a:defRPr>
+                <a:solidFill>
+                  <a:schemeClr val="dk1"/>
+                </a:solidFill>
+              </a:defRPr>
+            </a:lvl2pPr>
+            <a:lvl3pPr>
+              <a:defRPr>
+                <a:solidFill>
+                  <a:schemeClr val="dk1"/>
+                </a:solidFill>
+              </a:defRPr>
+            </a:lvl3pPr>
+            <a:lvl4pPr>
+              <a:defRPr>
+                <a:solidFill>
+                  <a:schemeClr val="dk1"/>
+                </a:solidFill>
+              </a:defRPr>
+            </a:lvl4pPr>
+            <a:lvl5pPr>
+              <a:defRPr>
+                <a:solidFill>
+                  <a:schemeClr val="dk1"/>
+                </a:solidFill>
+              </a:defRPr>
+            </a:lvl5pPr>
+            <a:lvl6pPr>
+              <a:defRPr>
+                <a:solidFill>
+                  <a:schemeClr val="dk1"/>
+                </a:solidFill>
+              </a:defRPr>
+            </a:lvl6pPr>
+            <a:lvl7pPr>
+              <a:defRPr>
+                <a:solidFill>
+                  <a:schemeClr val="dk1"/>
+                </a:solidFill>
+              </a:defRPr>
+            </a:lvl7pPr>
+            <a:lvl8pPr>
+              <a:defRPr>
+                <a:solidFill>
+                  <a:schemeClr val="dk1"/>
+                </a:solidFill>
+              </a:defRPr>
+            </a:lvl8pPr>
+            <a:lvl9pPr>
+              <a:defRPr>
+                <a:solidFill>
+                  <a:schemeClr val="dk1"/>
+                </a:solidFill>
+              </a:defRPr>
+            </a:lvl9pPr>
+          </a:lstStyle>
+          <a:p>
+            <a:pPr defTabSz="672130"/>
+            <a:r>
+              <a:rPr lang="pt-BR" sz="1176" b="0" dirty="0">
+                <a:solidFill>
+                  <a:prstClr val="black"/>
+                </a:solidFill>
+                <a:latin typeface="Exo 2 Medium" panose="00000600000000000000" pitchFamily="50" charset="0"/>
+              </a:rPr>
+              <a:t>Plataforma</a:t>
+            </a:r>
+          </a:p>
+        </p:txBody>
+      </p:sp>
+      <p:sp>
+        <p:nvSpPr>
+          <p:cNvPr id="82" name="TextBox 128"/>
+          <p:cNvSpPr txBox="1"/>
+          <p:nvPr/>
+        </p:nvSpPr>
+        <p:spPr>
+          <a:xfrm>
+            <a:off x="9854245" y="576471"/>
+            <a:ext cx="899678" cy="179824"/>
+          </a:xfrm>
+          <a:prstGeom prst="rect">
+            <a:avLst/>
+          </a:prstGeom>
+          <a:noFill/>
+          <a:ln w="12700">
+            <a:noFill/>
+          </a:ln>
+        </p:spPr>
+        <p:style>
+          <a:lnRef idx="2">
+            <a:schemeClr val="accent4"/>
+          </a:lnRef>
+          <a:fillRef idx="1">
+            <a:schemeClr val="lt1"/>
+          </a:fillRef>
+          <a:effectRef idx="0">
+            <a:schemeClr val="accent4"/>
+          </a:effectRef>
+          <a:fontRef idx="minor">
+            <a:schemeClr val="dk1"/>
+          </a:fontRef>
+        </p:style>
+        <p:txBody>
+          <a:bodyPr wrap="none" lIns="52922" tIns="52922" rIns="52922" bIns="0" rtlCol="0" anchor="b"/>
+          <a:lstStyle>
+            <a:defPPr>
+              <a:defRPr lang="en-US"/>
+            </a:defPPr>
+            <a:lvl1pPr algn="ctr">
+              <a:defRPr sz="1000" b="1">
+                <a:latin typeface="Simplon BP Regular"/>
+                <a:cs typeface="Simplon BP Regular"/>
+              </a:defRPr>
+            </a:lvl1pPr>
+            <a:lvl2pPr>
+              <a:defRPr>
+                <a:solidFill>
+                  <a:schemeClr val="dk1"/>
+                </a:solidFill>
+              </a:defRPr>
+            </a:lvl2pPr>
+            <a:lvl3pPr>
+              <a:defRPr>
+                <a:solidFill>
+                  <a:schemeClr val="dk1"/>
+                </a:solidFill>
+              </a:defRPr>
+            </a:lvl3pPr>
+            <a:lvl4pPr>
+              <a:defRPr>
+                <a:solidFill>
+                  <a:schemeClr val="dk1"/>
+                </a:solidFill>
+              </a:defRPr>
+            </a:lvl4pPr>
+            <a:lvl5pPr>
+              <a:defRPr>
+                <a:solidFill>
+                  <a:schemeClr val="dk1"/>
+                </a:solidFill>
+              </a:defRPr>
+            </a:lvl5pPr>
+            <a:lvl6pPr>
+              <a:defRPr>
+                <a:solidFill>
+                  <a:schemeClr val="dk1"/>
+                </a:solidFill>
+              </a:defRPr>
+            </a:lvl6pPr>
+            <a:lvl7pPr>
+              <a:defRPr>
+                <a:solidFill>
+                  <a:schemeClr val="dk1"/>
+                </a:solidFill>
+              </a:defRPr>
+            </a:lvl7pPr>
+            <a:lvl8pPr>
+              <a:defRPr>
+                <a:solidFill>
+                  <a:schemeClr val="dk1"/>
+                </a:solidFill>
+              </a:defRPr>
+            </a:lvl8pPr>
+            <a:lvl9pPr>
+              <a:defRPr>
+                <a:solidFill>
+                  <a:schemeClr val="dk1"/>
+                </a:solidFill>
+              </a:defRPr>
+            </a:lvl9pPr>
+          </a:lstStyle>
+          <a:p>
+            <a:pPr defTabSz="672130"/>
+            <a:r>
+              <a:rPr lang="pt-BR" sz="1176" b="0" dirty="0">
+                <a:solidFill>
+                  <a:prstClr val="black"/>
+                </a:solidFill>
+                <a:latin typeface="Exo 2 Medium" panose="00000600000000000000" pitchFamily="50" charset="0"/>
+              </a:rPr>
+              <a:t>Back</a:t>
+            </a:r>
+          </a:p>
+        </p:txBody>
+      </p:sp>
+      <p:sp>
+        <p:nvSpPr>
+          <p:cNvPr id="84" name="TextBox 133"/>
+          <p:cNvSpPr txBox="1"/>
+          <p:nvPr/>
+        </p:nvSpPr>
+        <p:spPr>
+          <a:xfrm>
+            <a:off x="8888645" y="576471"/>
+            <a:ext cx="899678" cy="179824"/>
+          </a:xfrm>
+          <a:prstGeom prst="rect">
+            <a:avLst/>
+          </a:prstGeom>
+          <a:noFill/>
+          <a:ln w="12700">
+            <a:noFill/>
+          </a:ln>
+        </p:spPr>
+        <p:style>
+          <a:lnRef idx="2">
+            <a:schemeClr val="accent4"/>
+          </a:lnRef>
+          <a:fillRef idx="1">
+            <a:schemeClr val="lt1"/>
+          </a:fillRef>
+          <a:effectRef idx="0">
+            <a:schemeClr val="accent4"/>
+          </a:effectRef>
+          <a:fontRef idx="minor">
+            <a:schemeClr val="dk1"/>
+          </a:fontRef>
+        </p:style>
+        <p:txBody>
+          <a:bodyPr wrap="none" lIns="52922" tIns="52922" rIns="52922" bIns="0" rtlCol="0" anchor="b"/>
+          <a:lstStyle>
+            <a:defPPr>
+              <a:defRPr lang="en-US"/>
+            </a:defPPr>
+            <a:lvl1pPr algn="ctr">
+              <a:defRPr sz="1000" b="1">
+                <a:latin typeface="Simplon BP Regular"/>
+                <a:cs typeface="Simplon BP Regular"/>
+              </a:defRPr>
+            </a:lvl1pPr>
+            <a:lvl2pPr>
+              <a:defRPr>
+                <a:solidFill>
+                  <a:schemeClr val="dk1"/>
+                </a:solidFill>
+              </a:defRPr>
+            </a:lvl2pPr>
+            <a:lvl3pPr>
+              <a:defRPr>
+                <a:solidFill>
+                  <a:schemeClr val="dk1"/>
+                </a:solidFill>
+              </a:defRPr>
+            </a:lvl3pPr>
+            <a:lvl4pPr>
+              <a:defRPr>
+                <a:solidFill>
+                  <a:schemeClr val="dk1"/>
+                </a:solidFill>
+              </a:defRPr>
+            </a:lvl4pPr>
+            <a:lvl5pPr>
+              <a:defRPr>
+                <a:solidFill>
+                  <a:schemeClr val="dk1"/>
+                </a:solidFill>
+              </a:defRPr>
+            </a:lvl5pPr>
+            <a:lvl6pPr>
+              <a:defRPr>
+                <a:solidFill>
+                  <a:schemeClr val="dk1"/>
+                </a:solidFill>
+              </a:defRPr>
+            </a:lvl6pPr>
+            <a:lvl7pPr>
+              <a:defRPr>
+                <a:solidFill>
+                  <a:schemeClr val="dk1"/>
+                </a:solidFill>
+              </a:defRPr>
+            </a:lvl7pPr>
+            <a:lvl8pPr>
+              <a:defRPr>
+                <a:solidFill>
+                  <a:schemeClr val="dk1"/>
+                </a:solidFill>
+              </a:defRPr>
+            </a:lvl8pPr>
+            <a:lvl9pPr>
+              <a:defRPr>
+                <a:solidFill>
+                  <a:schemeClr val="dk1"/>
+                </a:solidFill>
+              </a:defRPr>
+            </a:lvl9pPr>
+          </a:lstStyle>
+          <a:p>
+            <a:pPr defTabSz="672130"/>
+            <a:r>
+              <a:rPr lang="pt-BR" sz="1176" b="0" dirty="0">
+                <a:solidFill>
+                  <a:prstClr val="black"/>
+                </a:solidFill>
+                <a:latin typeface="Exo 2 Medium" panose="00000600000000000000" pitchFamily="50" charset="0"/>
+              </a:rPr>
+              <a:t>Front</a:t>
+            </a:r>
+          </a:p>
+        </p:txBody>
+      </p:sp>
+      <p:sp>
+        <p:nvSpPr>
+          <p:cNvPr id="88" name="Oval 134"/>
+          <p:cNvSpPr>
+            <a:spLocks noChangeAspect="1"/>
+          </p:cNvSpPr>
+          <p:nvPr/>
+        </p:nvSpPr>
+        <p:spPr>
+          <a:xfrm>
+            <a:off x="8443555" y="297930"/>
+            <a:ext cx="211404" cy="211689"/>
+          </a:xfrm>
+          <a:prstGeom prst="ellipse">
+            <a:avLst/>
+          </a:prstGeom>
+          <a:solidFill>
+            <a:srgbClr val="1BCF13"/>
+          </a:solidFill>
+          <a:ln w="12700">
+            <a:solidFill>
+              <a:schemeClr val="accent3"/>
+            </a:solidFill>
+          </a:ln>
+        </p:spPr>
+        <p:style>
+          <a:lnRef idx="2">
+            <a:schemeClr val="accent1">
+              <a:shade val="50000"/>
+            </a:schemeClr>
+          </a:lnRef>
+          <a:fillRef idx="1">
+            <a:schemeClr val="accent1"/>
+          </a:fillRef>
+          <a:effectRef idx="0">
+            <a:schemeClr val="accent1"/>
+          </a:effectRef>
+          <a:fontRef idx="minor">
+            <a:schemeClr val="lt1"/>
+          </a:fontRef>
+        </p:style>
+        <p:txBody>
+          <a:bodyPr wrap="none" lIns="52922" tIns="52922" rIns="52922" rtlCol="0" anchor="ctr"/>
+          <a:lstStyle/>
+          <a:p>
+            <a:pPr algn="ctr" defTabSz="672130"/>
+            <a:endParaRPr lang="en-US" sz="1176" dirty="0">
+              <a:solidFill>
+                <a:prstClr val="black"/>
+              </a:solidFill>
+              <a:latin typeface="Exo 2 Medium" panose="00000600000000000000" pitchFamily="50" charset="0"/>
+              <a:cs typeface="Simplon BP Regular"/>
+            </a:endParaRPr>
+          </a:p>
+        </p:txBody>
+      </p:sp>
+      <p:sp>
+        <p:nvSpPr>
+          <p:cNvPr id="86" name="TextBox 138"/>
+          <p:cNvSpPr txBox="1"/>
+          <p:nvPr/>
+        </p:nvSpPr>
+        <p:spPr>
+          <a:xfrm>
+            <a:off x="8126053" y="576471"/>
+            <a:ext cx="899678" cy="179824"/>
+          </a:xfrm>
+          <a:prstGeom prst="rect">
+            <a:avLst/>
+          </a:prstGeom>
+          <a:noFill/>
+          <a:ln w="12700">
+            <a:noFill/>
+          </a:ln>
+        </p:spPr>
+        <p:style>
+          <a:lnRef idx="2">
+            <a:schemeClr val="accent4"/>
+          </a:lnRef>
+          <a:fillRef idx="1">
+            <a:schemeClr val="lt1"/>
+          </a:fillRef>
+          <a:effectRef idx="0">
+            <a:schemeClr val="accent4"/>
+          </a:effectRef>
+          <a:fontRef idx="minor">
+            <a:schemeClr val="dk1"/>
+          </a:fontRef>
+        </p:style>
+        <p:txBody>
+          <a:bodyPr wrap="none" lIns="52922" tIns="52922" rIns="52922" bIns="0" rtlCol="0" anchor="b"/>
+          <a:lstStyle>
+            <a:defPPr>
+              <a:defRPr lang="en-US"/>
+            </a:defPPr>
+            <a:lvl1pPr algn="ctr">
+              <a:defRPr sz="1000" b="1">
+                <a:latin typeface="Simplon BP Regular"/>
+                <a:cs typeface="Simplon BP Regular"/>
+              </a:defRPr>
+            </a:lvl1pPr>
+            <a:lvl2pPr>
+              <a:defRPr>
+                <a:solidFill>
+                  <a:schemeClr val="dk1"/>
+                </a:solidFill>
+              </a:defRPr>
+            </a:lvl2pPr>
+            <a:lvl3pPr>
+              <a:defRPr>
+                <a:solidFill>
+                  <a:schemeClr val="dk1"/>
+                </a:solidFill>
+              </a:defRPr>
+            </a:lvl3pPr>
+            <a:lvl4pPr>
+              <a:defRPr>
+                <a:solidFill>
+                  <a:schemeClr val="dk1"/>
+                </a:solidFill>
+              </a:defRPr>
+            </a:lvl4pPr>
+            <a:lvl5pPr>
+              <a:defRPr>
+                <a:solidFill>
+                  <a:schemeClr val="dk1"/>
+                </a:solidFill>
+              </a:defRPr>
+            </a:lvl5pPr>
+            <a:lvl6pPr>
+              <a:defRPr>
+                <a:solidFill>
+                  <a:schemeClr val="dk1"/>
+                </a:solidFill>
+              </a:defRPr>
+            </a:lvl6pPr>
+            <a:lvl7pPr>
+              <a:defRPr>
+                <a:solidFill>
+                  <a:schemeClr val="dk1"/>
+                </a:solidFill>
+              </a:defRPr>
+            </a:lvl7pPr>
+            <a:lvl8pPr>
+              <a:defRPr>
+                <a:solidFill>
+                  <a:schemeClr val="dk1"/>
+                </a:solidFill>
+              </a:defRPr>
+            </a:lvl8pPr>
+            <a:lvl9pPr>
+              <a:defRPr>
+                <a:solidFill>
+                  <a:schemeClr val="dk1"/>
+                </a:solidFill>
+              </a:defRPr>
+            </a:lvl9pPr>
+          </a:lstStyle>
+          <a:p>
+            <a:pPr defTabSz="672130"/>
+            <a:r>
+              <a:rPr lang="en-US" sz="1176" b="0" dirty="0">
+                <a:solidFill>
+                  <a:prstClr val="black"/>
+                </a:solidFill>
+                <a:latin typeface="Exo 2 Medium" panose="00000600000000000000" pitchFamily="50" charset="0"/>
+              </a:rPr>
+              <a:t>Equipe</a:t>
+            </a:r>
+          </a:p>
+        </p:txBody>
+      </p:sp>
+      <p:sp>
+        <p:nvSpPr>
+          <p:cNvPr id="64" name="Retângulo 63"/>
+          <p:cNvSpPr/>
+          <p:nvPr/>
+        </p:nvSpPr>
+        <p:spPr>
+          <a:xfrm>
+            <a:off x="512766" y="868345"/>
+            <a:ext cx="6186608" cy="238150"/>
+          </a:xfrm>
+          <a:prstGeom prst="rect">
+            <a:avLst/>
+          </a:prstGeom>
+          <a:solidFill>
+            <a:schemeClr val="bg1">
+              <a:lumMod val="85000"/>
+            </a:schemeClr>
+          </a:solidFill>
+        </p:spPr>
+        <p:txBody>
+          <a:bodyPr vert="horz" lIns="134422" tIns="67211" rIns="134422" bIns="67211" rtlCol="0" anchor="ctr"/>
+          <a:lstStyle/>
+          <a:p>
+            <a:pPr defTabSz="672130"/>
+            <a:r>
+              <a:rPr lang="en-US" sz="1544" dirty="0">
+                <a:latin typeface="Exo 2 Medium" panose="00000600000000000000" pitchFamily="50" charset="0"/>
+                <a:ea typeface="Simplon Oi Headline" charset="0"/>
+                <a:cs typeface="Simplon Oi Headline" charset="0"/>
+              </a:rPr>
+              <a:t>Progressos c/ responsáveis </a:t>
+            </a:r>
+          </a:p>
+        </p:txBody>
+      </p:sp>
+      <p:sp>
+        <p:nvSpPr>
+          <p:cNvPr id="65" name="Retângulo 64"/>
+          <p:cNvSpPr/>
+          <p:nvPr/>
+        </p:nvSpPr>
+        <p:spPr>
+          <a:xfrm>
+            <a:off x="6814576" y="868345"/>
+            <a:ext cx="6194715" cy="238150"/>
+          </a:xfrm>
+          <a:prstGeom prst="rect">
+            <a:avLst/>
+          </a:prstGeom>
+          <a:solidFill>
+            <a:schemeClr val="bg1">
+              <a:lumMod val="85000"/>
+            </a:schemeClr>
+          </a:solidFill>
+        </p:spPr>
+        <p:txBody>
+          <a:bodyPr vert="horz" lIns="134422" tIns="67211" rIns="134422" bIns="67211" rtlCol="0" anchor="ctr"/>
+          <a:lstStyle/>
+          <a:p>
+            <a:pPr defTabSz="672130"/>
+            <a:r>
+              <a:rPr lang="pt-BR" sz="1544" dirty="0">
+                <a:latin typeface="Exo 2 Medium" panose="00000600000000000000" pitchFamily="50" charset="0"/>
+                <a:ea typeface="Simplon Oi Headline" charset="0"/>
+                <a:cs typeface="Simplon Oi Headline" charset="0"/>
+              </a:rPr>
+              <a:t>Pontos atenção/ Principais Riscos</a:t>
+            </a:r>
+          </a:p>
+        </p:txBody>
+      </p:sp>
+      <p:sp>
+        <p:nvSpPr>
+          <p:cNvPr id="66" name="Retângulo 65"/>
+          <p:cNvSpPr/>
+          <p:nvPr/>
+        </p:nvSpPr>
+        <p:spPr>
+          <a:xfrm>
+            <a:off x="507536" y="3418875"/>
+            <a:ext cx="12505521" cy="238150"/>
+          </a:xfrm>
+          <a:prstGeom prst="rect">
+            <a:avLst/>
+          </a:prstGeom>
+          <a:solidFill>
+            <a:schemeClr val="bg1">
+              <a:lumMod val="85000"/>
+            </a:schemeClr>
+          </a:solidFill>
+        </p:spPr>
+        <p:txBody>
+          <a:bodyPr vert="horz" lIns="134422" tIns="67211" rIns="134422" bIns="67211" rtlCol="0" anchor="ctr"/>
+          <a:lstStyle/>
+          <a:p>
+            <a:pPr defTabSz="672130"/>
+            <a:r>
+              <a:rPr lang="pt-BR" sz="1544" dirty="0">
+                <a:latin typeface="Exo 2 Medium" panose="00000600000000000000" pitchFamily="50" charset="0"/>
+                <a:ea typeface="Simplon Oi Headline" charset="0"/>
+                <a:cs typeface="Simplon Oi Headline" charset="0"/>
+              </a:rPr>
+              <a:t>Próximos Passos c/ responsáveis </a:t>
+            </a:r>
+          </a:p>
+        </p:txBody>
+      </p:sp>
+      <p:sp>
+        <p:nvSpPr>
+          <p:cNvPr id="63" name="Rectangle 37"/>
+          <p:cNvSpPr/>
+          <p:nvPr/>
+        </p:nvSpPr>
+        <p:spPr>
+          <a:xfrm>
+            <a:off x="496765" y="1106495"/>
+            <a:ext cx="6207777" cy="2235805"/>
+          </a:xfrm>
+          <a:prstGeom prst="rect">
+            <a:avLst/>
+          </a:prstGeom>
+          <a:noFill/>
+          <a:ln w="12700">
+            <a:solidFill>
+              <a:schemeClr val="bg1">
+                <a:lumMod val="50000"/>
+              </a:schemeClr>
+            </a:solidFill>
+          </a:ln>
+        </p:spPr>
+        <p:style>
+          <a:lnRef idx="2">
+            <a:schemeClr val="accent4"/>
+          </a:lnRef>
+          <a:fillRef idx="1">
+            <a:schemeClr val="lt1"/>
+          </a:fillRef>
+          <a:effectRef idx="0">
+            <a:schemeClr val="accent4"/>
+          </a:effectRef>
+          <a:fontRef idx="minor">
+            <a:schemeClr val="dk1"/>
+          </a:fontRef>
+        </p:style>
+        <p:txBody>
+          <a:bodyPr tIns="105844" rtlCol="0" anchor="t"/>
+          <a:lstStyle/>
+          <a:p>
+            <a:pPr marL="252049" indent="-252049" fontAlgn="base">
+              <a:spcBef>
+                <a:spcPct val="0"/>
+              </a:spcBef>
+              <a:buFont typeface="Wingdings" panose="05000000000000000000" pitchFamily="2" charset="2"/>
+              <a:buChar char="ü"/>
+              <a:defRPr/>
+            </a:pPr>
+            <a:r>
+              <a:rPr lang="pt-BR" sz="1323" dirty="0">
+                <a:solidFill>
+                  <a:schemeClr val="tx1"/>
+                </a:solidFill>
+                <a:latin typeface="Exo 2 Medium" panose="00000600000000000000" pitchFamily="50" charset="0"/>
+                <a:cs typeface="Simplon BP Regular"/>
+              </a:rPr>
+              <a:t>Contexto e justificativa do negócio </a:t>
+            </a:r>
+            <a:r>
+              <a:rPr lang="pt-BR" sz="1323" b="1" dirty="0">
+                <a:solidFill>
+                  <a:schemeClr val="tx1"/>
+                </a:solidFill>
+                <a:latin typeface="Exo 2 Medium" panose="00000600000000000000" pitchFamily="50" charset="0"/>
+                <a:cs typeface="Simplon BP Regular"/>
+              </a:rPr>
+              <a:t>#Gabriel Ferraz e #Gabriel Wesley</a:t>
+            </a:r>
+          </a:p>
+          <a:p>
+            <a:pPr marL="252049" indent="-252049" fontAlgn="base">
+              <a:spcBef>
+                <a:spcPct val="0"/>
+              </a:spcBef>
+              <a:buFont typeface="Wingdings" panose="05000000000000000000" pitchFamily="2" charset="2"/>
+              <a:buChar char="ü"/>
+              <a:defRPr/>
+            </a:pPr>
+            <a:r>
+              <a:rPr lang="pt-BR" sz="1323" dirty="0">
+                <a:solidFill>
+                  <a:schemeClr val="tx1"/>
+                </a:solidFill>
+                <a:latin typeface="Exo 2 Medium" panose="00000600000000000000" pitchFamily="50" charset="0"/>
+                <a:cs typeface="Simplon BP Regular"/>
+              </a:rPr>
+              <a:t>HLD </a:t>
+            </a:r>
+            <a:r>
+              <a:rPr lang="pt-BR" sz="1323" b="1" dirty="0">
+                <a:solidFill>
+                  <a:schemeClr val="tx1"/>
+                </a:solidFill>
+                <a:latin typeface="Exo 2 Medium" panose="00000600000000000000" pitchFamily="50" charset="0"/>
+                <a:cs typeface="Simplon BP Regular"/>
+              </a:rPr>
+              <a:t>#Ferraz e #Pedro</a:t>
+            </a:r>
+          </a:p>
+          <a:p>
+            <a:pPr marL="252049" indent="-252049" fontAlgn="base">
+              <a:spcBef>
+                <a:spcPct val="0"/>
+              </a:spcBef>
+              <a:buFont typeface="Wingdings" panose="05000000000000000000" pitchFamily="2" charset="2"/>
+              <a:buChar char="ü"/>
+              <a:defRPr/>
+            </a:pPr>
+            <a:r>
+              <a:rPr lang="pt-BR" sz="1323" dirty="0">
+                <a:solidFill>
+                  <a:schemeClr val="tx1"/>
+                </a:solidFill>
+                <a:latin typeface="Exo 2 Medium" panose="00000600000000000000" pitchFamily="50" charset="0"/>
+                <a:cs typeface="Simplon BP Regular"/>
+              </a:rPr>
+              <a:t>Mapa de Empatia (Dono da quadra)</a:t>
+            </a:r>
+            <a:r>
+              <a:rPr lang="pt-BR" sz="1323" b="1" dirty="0">
+                <a:solidFill>
+                  <a:schemeClr val="tx1"/>
+                </a:solidFill>
+                <a:latin typeface="Exo 2 Medium" panose="00000600000000000000" pitchFamily="50" charset="0"/>
+                <a:cs typeface="Simplon BP Regular"/>
+              </a:rPr>
+              <a:t>#Equipe</a:t>
+            </a:r>
+          </a:p>
+          <a:p>
+            <a:pPr marL="252049" indent="-252049" fontAlgn="base">
+              <a:spcBef>
+                <a:spcPct val="0"/>
+              </a:spcBef>
+              <a:buFont typeface="Wingdings" panose="05000000000000000000" pitchFamily="2" charset="2"/>
+              <a:buChar char="ü"/>
+              <a:defRPr/>
+            </a:pPr>
+            <a:r>
+              <a:rPr lang="pt-BR" sz="1323" dirty="0">
+                <a:solidFill>
+                  <a:schemeClr val="tx1"/>
+                </a:solidFill>
+                <a:latin typeface="Exo 2 Medium" panose="00000600000000000000" pitchFamily="50" charset="0"/>
+                <a:cs typeface="Simplon BP Regular"/>
+              </a:rPr>
+              <a:t>Inicio a jornada do usuário </a:t>
+            </a:r>
+            <a:r>
+              <a:rPr lang="pt-BR" sz="1323" b="1" dirty="0">
+                <a:solidFill>
+                  <a:schemeClr val="tx1"/>
+                </a:solidFill>
+                <a:latin typeface="Exo 2 Medium" panose="00000600000000000000" pitchFamily="50" charset="0"/>
+                <a:cs typeface="Simplon BP Regular"/>
+              </a:rPr>
+              <a:t>#Equipe</a:t>
+            </a:r>
+          </a:p>
+          <a:p>
+            <a:pPr marL="252049" indent="-252049" fontAlgn="base">
+              <a:spcBef>
+                <a:spcPct val="0"/>
+              </a:spcBef>
+              <a:buFont typeface="Wingdings" panose="05000000000000000000" pitchFamily="2" charset="2"/>
+              <a:buChar char="ü"/>
+              <a:defRPr/>
+            </a:pPr>
+            <a:r>
+              <a:rPr lang="pt-BR" sz="1323" dirty="0">
+                <a:solidFill>
+                  <a:schemeClr val="tx1"/>
+                </a:solidFill>
+                <a:latin typeface="Exo 2 Medium" panose="00000600000000000000" pitchFamily="50" charset="0"/>
+                <a:cs typeface="Simplon BP Regular"/>
+              </a:rPr>
+              <a:t>Formulário de perguntas para jogadores </a:t>
+            </a:r>
+            <a:r>
+              <a:rPr lang="pt-BR" sz="1323" b="1" dirty="0">
+                <a:solidFill>
+                  <a:schemeClr val="tx1"/>
+                </a:solidFill>
+                <a:latin typeface="Exo 2 Medium" panose="00000600000000000000" pitchFamily="50" charset="0"/>
+                <a:cs typeface="Simplon BP Regular"/>
+              </a:rPr>
+              <a:t>#Alvares</a:t>
+            </a:r>
+          </a:p>
+          <a:p>
+            <a:pPr marL="252049" indent="-252049" fontAlgn="base">
+              <a:spcBef>
+                <a:spcPct val="0"/>
+              </a:spcBef>
+              <a:buFont typeface="Wingdings" panose="05000000000000000000" pitchFamily="2" charset="2"/>
+              <a:buChar char="ü"/>
+              <a:defRPr/>
+            </a:pPr>
+            <a:r>
+              <a:rPr lang="pt-BR" sz="1323" dirty="0">
+                <a:solidFill>
+                  <a:schemeClr val="tx1"/>
+                </a:solidFill>
+                <a:latin typeface="Exo 2 Medium" panose="00000600000000000000" pitchFamily="50" charset="0"/>
+                <a:cs typeface="Simplon BP Regular"/>
+              </a:rPr>
+              <a:t>Entrevista com dono da quadra</a:t>
+            </a:r>
+            <a:r>
+              <a:rPr lang="pt-BR" sz="1323" b="1" dirty="0">
+                <a:solidFill>
+                  <a:schemeClr val="tx1"/>
+                </a:solidFill>
+                <a:latin typeface="Exo 2 Medium" panose="00000600000000000000" pitchFamily="50" charset="0"/>
+                <a:cs typeface="Simplon BP Regular"/>
+              </a:rPr>
+              <a:t> #Alvares</a:t>
+            </a:r>
+          </a:p>
+          <a:p>
+            <a:pPr marL="252049" indent="-252049" fontAlgn="base">
+              <a:spcBef>
+                <a:spcPct val="0"/>
+              </a:spcBef>
+              <a:buFont typeface="Wingdings" panose="05000000000000000000" pitchFamily="2" charset="2"/>
+              <a:buChar char="ü"/>
+              <a:defRPr/>
+            </a:pPr>
+            <a:r>
+              <a:rPr lang="pt-BR" sz="1323" dirty="0">
+                <a:solidFill>
+                  <a:schemeClr val="tx1"/>
+                </a:solidFill>
+                <a:latin typeface="Exo 2 Medium" panose="00000600000000000000" pitchFamily="50" charset="0"/>
+                <a:cs typeface="Simplon BP Regular"/>
+              </a:rPr>
+              <a:t>Prototipação da pagina home </a:t>
+            </a:r>
+            <a:r>
+              <a:rPr lang="pt-BR" sz="1323" b="1" dirty="0">
+                <a:solidFill>
+                  <a:schemeClr val="tx1"/>
+                </a:solidFill>
+                <a:latin typeface="Exo 2 Medium" panose="00000600000000000000" pitchFamily="50" charset="0"/>
+                <a:cs typeface="Simplon BP Regular"/>
+              </a:rPr>
+              <a:t>#Vinicius e #Pedro</a:t>
+            </a:r>
+          </a:p>
+          <a:p>
+            <a:pPr marL="252049" indent="-252049" fontAlgn="base">
+              <a:spcBef>
+                <a:spcPct val="0"/>
+              </a:spcBef>
+              <a:buFont typeface="Wingdings" panose="05000000000000000000" pitchFamily="2" charset="2"/>
+              <a:buChar char="ü"/>
+              <a:defRPr/>
+            </a:pPr>
+            <a:r>
+              <a:rPr lang="pt-BR" sz="1323" dirty="0">
+                <a:solidFill>
+                  <a:schemeClr val="tx1"/>
+                </a:solidFill>
+                <a:latin typeface="Exo 2 Medium" panose="00000600000000000000" pitchFamily="50" charset="0"/>
+                <a:cs typeface="Simplon BP Regular"/>
+              </a:rPr>
+              <a:t>Migração do repositório JIRA </a:t>
+            </a:r>
+            <a:r>
+              <a:rPr lang="pt-BR" sz="1323" b="1" dirty="0">
+                <a:solidFill>
+                  <a:schemeClr val="tx1"/>
+                </a:solidFill>
+                <a:latin typeface="Exo 2 Medium" panose="00000600000000000000" pitchFamily="50" charset="0"/>
+                <a:cs typeface="Simplon BP Regular"/>
+              </a:rPr>
+              <a:t>#Wesley e Pedro</a:t>
+            </a:r>
+          </a:p>
+          <a:p>
+            <a:pPr marL="252049" indent="-252049" fontAlgn="base">
+              <a:spcBef>
+                <a:spcPct val="0"/>
+              </a:spcBef>
+              <a:buFont typeface="Wingdings" panose="05000000000000000000" pitchFamily="2" charset="2"/>
+              <a:buChar char="ü"/>
+              <a:defRPr/>
+            </a:pPr>
+            <a:endParaRPr lang="pt-BR" sz="1323" b="1" dirty="0">
+              <a:solidFill>
+                <a:schemeClr val="tx1"/>
+              </a:solidFill>
+              <a:latin typeface="Exo 2 Medium" panose="00000600000000000000" pitchFamily="50" charset="0"/>
+              <a:cs typeface="Simplon BP Regular"/>
+            </a:endParaRPr>
+          </a:p>
+          <a:p>
+            <a:pPr fontAlgn="base">
+              <a:spcBef>
+                <a:spcPct val="0"/>
+              </a:spcBef>
+              <a:defRPr/>
+            </a:pPr>
+            <a:endParaRPr lang="pt-BR" sz="1323" b="1" dirty="0">
+              <a:solidFill>
+                <a:schemeClr val="tx1"/>
+              </a:solidFill>
+              <a:latin typeface="Exo 2 Medium" panose="00000600000000000000" pitchFamily="50" charset="0"/>
+              <a:cs typeface="Simplon BP Regular"/>
+            </a:endParaRPr>
+          </a:p>
+          <a:p>
+            <a:pPr marL="252049" indent="-252049" fontAlgn="base">
+              <a:spcBef>
+                <a:spcPct val="0"/>
+              </a:spcBef>
+              <a:buFont typeface="Wingdings" panose="05000000000000000000" pitchFamily="2" charset="2"/>
+              <a:buChar char="ü"/>
+              <a:defRPr/>
+            </a:pPr>
+            <a:endParaRPr lang="pt-BR" sz="1323" b="1" dirty="0">
+              <a:solidFill>
+                <a:schemeClr val="tx1"/>
+              </a:solidFill>
+              <a:latin typeface="Exo 2 Medium" panose="00000600000000000000" pitchFamily="50" charset="0"/>
+              <a:cs typeface="Simplon BP Regular"/>
+            </a:endParaRPr>
+          </a:p>
+          <a:p>
+            <a:pPr marL="252049" indent="-252049" fontAlgn="base">
+              <a:spcBef>
+                <a:spcPct val="0"/>
+              </a:spcBef>
+              <a:buFont typeface="Wingdings" panose="05000000000000000000" pitchFamily="2" charset="2"/>
+              <a:buChar char="ü"/>
+              <a:defRPr/>
+            </a:pPr>
+            <a:endParaRPr lang="pt-BR" sz="1323" b="1" dirty="0">
+              <a:solidFill>
+                <a:schemeClr val="tx1"/>
+              </a:solidFill>
+              <a:latin typeface="Exo 2 Medium" panose="00000600000000000000" pitchFamily="50" charset="0"/>
+              <a:cs typeface="Simplon BP Regular"/>
+            </a:endParaRPr>
+          </a:p>
+          <a:p>
+            <a:pPr marL="252049" indent="-252049" fontAlgn="base">
+              <a:spcBef>
+                <a:spcPct val="0"/>
+              </a:spcBef>
+              <a:buFont typeface="Wingdings" panose="05000000000000000000" pitchFamily="2" charset="2"/>
+              <a:buChar char="ü"/>
+              <a:defRPr/>
+            </a:pPr>
+            <a:endParaRPr lang="pt-BR" sz="1323" b="1" dirty="0">
+              <a:solidFill>
+                <a:schemeClr val="tx1"/>
+              </a:solidFill>
+              <a:latin typeface="Exo 2 Medium" panose="00000600000000000000" pitchFamily="50" charset="0"/>
+              <a:cs typeface="Simplon BP Regular"/>
+            </a:endParaRPr>
+          </a:p>
+          <a:p>
+            <a:pPr marL="252049" lvl="1" indent="-252049" fontAlgn="base">
+              <a:spcBef>
+                <a:spcPct val="0"/>
+              </a:spcBef>
+              <a:buFont typeface="Wingdings" panose="05000000000000000000" pitchFamily="2" charset="2"/>
+              <a:buChar char="ü"/>
+              <a:defRPr/>
+            </a:pPr>
+            <a:endParaRPr lang="pt-BR" sz="1323" b="1" dirty="0">
+              <a:solidFill>
+                <a:schemeClr val="tx1"/>
+              </a:solidFill>
+              <a:latin typeface="Exo 2 Medium" panose="00000600000000000000" pitchFamily="50" charset="0"/>
+              <a:cs typeface="Simplon BP Regular"/>
+            </a:endParaRPr>
+          </a:p>
+          <a:p>
+            <a:pPr marL="252049" indent="-252049" fontAlgn="base">
+              <a:spcBef>
+                <a:spcPct val="0"/>
+              </a:spcBef>
+              <a:buFont typeface="Wingdings" panose="05000000000000000000" pitchFamily="2" charset="2"/>
+              <a:buChar char="ü"/>
+              <a:defRPr/>
+            </a:pPr>
+            <a:endParaRPr lang="pt-BR" sz="1323" b="1" dirty="0">
+              <a:solidFill>
+                <a:schemeClr val="tx1"/>
+              </a:solidFill>
+              <a:latin typeface="Exo 2 Medium" panose="00000600000000000000" pitchFamily="50" charset="0"/>
+              <a:cs typeface="Simplon BP Regular"/>
+            </a:endParaRPr>
+          </a:p>
+          <a:p>
+            <a:pPr marL="252049" indent="-252049" fontAlgn="base">
+              <a:spcBef>
+                <a:spcPct val="0"/>
+              </a:spcBef>
+              <a:buFont typeface="Wingdings" panose="05000000000000000000" pitchFamily="2" charset="2"/>
+              <a:buChar char="ü"/>
+              <a:defRPr/>
+            </a:pPr>
+            <a:endParaRPr lang="pt-BR" sz="1323" b="1" dirty="0">
+              <a:solidFill>
+                <a:schemeClr val="tx1"/>
+              </a:solidFill>
+              <a:latin typeface="Exo 2 Medium" panose="00000600000000000000" pitchFamily="50" charset="0"/>
+              <a:cs typeface="Simplon BP Regular"/>
+            </a:endParaRPr>
+          </a:p>
+        </p:txBody>
+      </p:sp>
+      <p:sp>
+        <p:nvSpPr>
+          <p:cNvPr id="4" name="Retângulo 3"/>
+          <p:cNvSpPr/>
+          <p:nvPr/>
+        </p:nvSpPr>
+        <p:spPr>
+          <a:xfrm>
+            <a:off x="6844996" y="1121895"/>
+            <a:ext cx="6164295" cy="499496"/>
+          </a:xfrm>
+          <a:prstGeom prst="rect">
+            <a:avLst/>
+          </a:prstGeom>
+        </p:spPr>
+        <p:txBody>
+          <a:bodyPr wrap="square">
+            <a:spAutoFit/>
+          </a:bodyPr>
+          <a:lstStyle/>
+          <a:p>
+            <a:pPr marL="252049" indent="-252049" fontAlgn="base">
+              <a:spcBef>
+                <a:spcPct val="0"/>
+              </a:spcBef>
+              <a:buFont typeface="Wingdings" panose="05000000000000000000" pitchFamily="2" charset="2"/>
+              <a:buChar char="§"/>
+              <a:defRPr/>
+            </a:pPr>
+            <a:r>
+              <a:rPr lang="pt-BR" sz="1323" dirty="0">
+                <a:latin typeface="Exo 2 Medium" panose="00000600000000000000" pitchFamily="50" charset="0"/>
+                <a:cs typeface="Simplon BP Regular"/>
+              </a:rPr>
+              <a:t>Possível atraso nas entregas</a:t>
+            </a:r>
+          </a:p>
+          <a:p>
+            <a:pPr marL="252049" indent="-252049" fontAlgn="base">
+              <a:spcBef>
+                <a:spcPct val="0"/>
+              </a:spcBef>
+              <a:buFont typeface="Wingdings" panose="05000000000000000000" pitchFamily="2" charset="2"/>
+              <a:buChar char="§"/>
+              <a:defRPr/>
+            </a:pPr>
+            <a:r>
+              <a:rPr lang="pt-BR" sz="1323" dirty="0">
+                <a:latin typeface="Exo 2 Medium" panose="00000600000000000000" pitchFamily="50" charset="0"/>
+                <a:cs typeface="Simplon BP Regular"/>
+              </a:rPr>
+              <a:t>Organização para ensaiar </a:t>
+            </a:r>
+          </a:p>
+        </p:txBody>
+      </p:sp>
+      <p:sp>
+        <p:nvSpPr>
+          <p:cNvPr id="2" name="Rectangle 43">
+            <a:extLst>
+              <a:ext uri="{FF2B5EF4-FFF2-40B4-BE49-F238E27FC236}">
+                <a16:creationId xmlns:a16="http://schemas.microsoft.com/office/drawing/2014/main" id="{B15BA19F-C787-4E6A-ADAB-C0DFF09C66A8}"/>
+              </a:ext>
+            </a:extLst>
+          </p:cNvPr>
+          <p:cNvSpPr>
+            <a:spLocks/>
+          </p:cNvSpPr>
+          <p:nvPr/>
+        </p:nvSpPr>
+        <p:spPr>
+          <a:xfrm>
+            <a:off x="512766" y="3728204"/>
+            <a:ext cx="12496524" cy="3581485"/>
+          </a:xfrm>
+          <a:prstGeom prst="rect">
+            <a:avLst/>
+          </a:prstGeom>
+          <a:noFill/>
+          <a:ln w="12700">
+            <a:solidFill>
+              <a:schemeClr val="bg1">
+                <a:lumMod val="50000"/>
+              </a:schemeClr>
+            </a:solidFill>
+          </a:ln>
+        </p:spPr>
+        <p:style>
+          <a:lnRef idx="2">
+            <a:schemeClr val="accent4"/>
+          </a:lnRef>
+          <a:fillRef idx="1">
+            <a:schemeClr val="lt1"/>
+          </a:fillRef>
+          <a:effectRef idx="0">
+            <a:schemeClr val="accent4"/>
+          </a:effectRef>
+          <a:fontRef idx="minor">
+            <a:schemeClr val="dk1"/>
+          </a:fontRef>
+        </p:style>
+        <p:txBody>
+          <a:bodyPr wrap="square" tIns="105844" numCol="3" rtlCol="0" anchor="t"/>
+          <a:lstStyle/>
+          <a:p>
+            <a:pPr marL="0" lvl="1" defTabSz="672130"/>
+            <a:r>
+              <a:rPr lang="pt-BR" sz="1323" b="1" dirty="0">
+                <a:solidFill>
+                  <a:schemeClr val="tx1"/>
+                </a:solidFill>
+                <a:latin typeface="Exo 2 Medium" panose="00000600000000000000" pitchFamily="50" charset="0"/>
+                <a:cs typeface="Simplon BP Regular"/>
+              </a:rPr>
+              <a:t>Frente Plataforma</a:t>
+            </a:r>
+          </a:p>
+          <a:p>
+            <a:pPr marL="285750" lvl="1" indent="-285750" defTabSz="672130">
+              <a:buFont typeface="Wingdings" panose="05000000000000000000" pitchFamily="2" charset="2"/>
+              <a:buChar char="§"/>
+            </a:pPr>
+            <a:r>
+              <a:rPr lang="pt-BR" sz="1323">
+                <a:solidFill>
+                  <a:schemeClr val="tx1"/>
+                </a:solidFill>
+                <a:latin typeface="Exo 2 Medium" panose="00000600000000000000" pitchFamily="50" charset="0"/>
+                <a:cs typeface="Simplon BP Regular"/>
+              </a:rPr>
+              <a:t>Sem atividades no momento</a:t>
+            </a:r>
+          </a:p>
+          <a:p>
+            <a:pPr marL="0" lvl="1" defTabSz="672130"/>
+            <a:endParaRPr lang="pt-BR" sz="1323" b="1" dirty="0">
+              <a:solidFill>
+                <a:schemeClr val="tx1"/>
+              </a:solidFill>
+              <a:latin typeface="Exo 2 Medium" panose="00000600000000000000" pitchFamily="50" charset="0"/>
+              <a:cs typeface="Simplon BP Regular"/>
+            </a:endParaRPr>
+          </a:p>
+          <a:p>
+            <a:pPr marL="0" lvl="1" defTabSz="672130"/>
+            <a:r>
+              <a:rPr lang="pt-BR" sz="1323" b="1" dirty="0">
+                <a:solidFill>
+                  <a:schemeClr val="tx1"/>
+                </a:solidFill>
+                <a:latin typeface="Exo 2 Medium" panose="00000600000000000000" pitchFamily="50" charset="0"/>
+                <a:cs typeface="Simplon BP Regular"/>
+              </a:rPr>
+              <a:t>Frente </a:t>
+            </a:r>
+            <a:r>
+              <a:rPr lang="pt-BR" sz="1323" b="1" dirty="0" err="1">
+                <a:solidFill>
+                  <a:schemeClr val="tx1"/>
+                </a:solidFill>
+                <a:latin typeface="Exo 2 Medium" panose="00000600000000000000" pitchFamily="50" charset="0"/>
+                <a:cs typeface="Simplon BP Regular"/>
+              </a:rPr>
+              <a:t>Backend</a:t>
+            </a:r>
+            <a:endParaRPr lang="pt-BR" sz="1323" b="1" dirty="0">
+              <a:solidFill>
+                <a:schemeClr val="tx1"/>
+              </a:solidFill>
+              <a:latin typeface="Exo 2 Medium" panose="00000600000000000000" pitchFamily="50" charset="0"/>
+              <a:cs typeface="Simplon BP Regular"/>
+            </a:endParaRPr>
+          </a:p>
+          <a:p>
+            <a:pPr marL="0" lvl="1" indent="-252049">
+              <a:buFont typeface="Wingdings" panose="05000000000000000000" pitchFamily="2" charset="2"/>
+              <a:buChar char="§"/>
+            </a:pPr>
+            <a:r>
+              <a:rPr lang="pt-BR" sz="1323" dirty="0">
+                <a:solidFill>
+                  <a:schemeClr val="tx1"/>
+                </a:solidFill>
+                <a:latin typeface="Exo 2 Medium" panose="00000600000000000000" pitchFamily="50" charset="0"/>
+                <a:cs typeface="Simplon BP Regular"/>
+              </a:rPr>
+              <a:t>Analise da Estrutura do projeto com classes abstratas ou interfaces </a:t>
+            </a:r>
+            <a:r>
+              <a:rPr lang="pt-BR" sz="1323" b="1" dirty="0">
+                <a:solidFill>
+                  <a:schemeClr val="tx1"/>
+                </a:solidFill>
+                <a:latin typeface="Exo 2 Medium" panose="00000600000000000000" pitchFamily="50" charset="0"/>
+                <a:cs typeface="Simplon BP Regular"/>
+              </a:rPr>
+              <a:t>#Wesley e Alvares</a:t>
+            </a:r>
+          </a:p>
+          <a:p>
+            <a:pPr marL="0" lvl="1" defTabSz="672130"/>
+            <a:endParaRPr lang="pt-BR" sz="1323" b="1" dirty="0">
+              <a:solidFill>
+                <a:schemeClr val="tx1"/>
+              </a:solidFill>
+              <a:latin typeface="Exo 2 Medium" panose="00000600000000000000" pitchFamily="50" charset="0"/>
+              <a:cs typeface="Simplon BP Regular"/>
+            </a:endParaRPr>
+          </a:p>
+          <a:p>
+            <a:pPr marL="0" lvl="1" defTabSz="672130"/>
+            <a:r>
+              <a:rPr lang="pt-BR" sz="1323" b="1" dirty="0">
+                <a:solidFill>
+                  <a:schemeClr val="tx1"/>
+                </a:solidFill>
+                <a:latin typeface="Exo 2 Medium" panose="00000600000000000000" pitchFamily="50" charset="0"/>
+                <a:cs typeface="Simplon BP Regular"/>
+              </a:rPr>
+              <a:t>Frente Front end</a:t>
+            </a:r>
+          </a:p>
+          <a:p>
+            <a:pPr marL="0" lvl="1" indent="-252049">
+              <a:buFont typeface="Wingdings" panose="05000000000000000000" pitchFamily="2" charset="2"/>
+              <a:buChar char="§"/>
+            </a:pPr>
+            <a:r>
+              <a:rPr lang="pt-BR" sz="1323" dirty="0">
+                <a:solidFill>
+                  <a:schemeClr val="tx1"/>
+                </a:solidFill>
+                <a:latin typeface="Exo 2 Medium" panose="00000600000000000000" pitchFamily="50" charset="0"/>
+                <a:cs typeface="Simplon BP Regular"/>
+              </a:rPr>
+              <a:t>Prototipação do Site Institucional </a:t>
+            </a:r>
+            <a:r>
+              <a:rPr lang="pt-BR" sz="1323" b="1" dirty="0">
+                <a:solidFill>
+                  <a:schemeClr val="tx1"/>
+                </a:solidFill>
+                <a:latin typeface="Exo 2 Medium" panose="00000600000000000000" pitchFamily="50" charset="0"/>
+                <a:cs typeface="Simplon BP Regular"/>
+              </a:rPr>
+              <a:t>#Pedro e Vinicius</a:t>
+            </a:r>
+          </a:p>
+          <a:p>
+            <a:pPr marL="0" lvl="1" defTabSz="672130"/>
+            <a:endParaRPr lang="pt-BR" sz="1600" b="1" dirty="0">
+              <a:solidFill>
+                <a:schemeClr val="tx1"/>
+              </a:solidFill>
+              <a:latin typeface="Exo 2 Medium" panose="00000600000000000000" pitchFamily="50" charset="0"/>
+              <a:cs typeface="Simplon BP Regular"/>
+            </a:endParaRPr>
+          </a:p>
+          <a:p>
+            <a:pPr marL="0" lvl="1" defTabSz="672130"/>
+            <a:r>
+              <a:rPr lang="pt-BR" sz="1320" b="1" dirty="0">
+                <a:solidFill>
+                  <a:schemeClr val="tx1"/>
+                </a:solidFill>
+                <a:latin typeface="Exo 2 Medium" panose="00000600000000000000" pitchFamily="50" charset="0"/>
+                <a:cs typeface="Simplon BP Regular"/>
+              </a:rPr>
+              <a:t>Frente Negócios</a:t>
+            </a:r>
+          </a:p>
+          <a:p>
+            <a:pPr marL="0" lvl="1" indent="-252049">
+              <a:buFont typeface="Wingdings" panose="05000000000000000000" pitchFamily="2" charset="2"/>
+              <a:buChar char="§"/>
+            </a:pPr>
+            <a:r>
+              <a:rPr lang="pt-BR" sz="1320" dirty="0">
+                <a:solidFill>
+                  <a:schemeClr val="tx1"/>
+                </a:solidFill>
+                <a:latin typeface="Exo 2 Medium" panose="00000600000000000000" pitchFamily="50" charset="0"/>
+                <a:cs typeface="Simplon BP Regular"/>
+              </a:rPr>
+              <a:t>Ajustes no HLD </a:t>
+            </a:r>
+            <a:r>
+              <a:rPr lang="pt-BR" sz="1320" b="1" dirty="0">
+                <a:solidFill>
+                  <a:schemeClr val="tx1"/>
+                </a:solidFill>
+                <a:latin typeface="Exo 2 Medium" panose="00000600000000000000" pitchFamily="50" charset="0"/>
+                <a:cs typeface="Simplon BP Regular"/>
+              </a:rPr>
+              <a:t>#Ferraz e Vinicius</a:t>
+            </a:r>
+          </a:p>
+          <a:p>
+            <a:pPr marL="0" lvl="1" indent="-252049">
+              <a:buFont typeface="Wingdings" panose="05000000000000000000" pitchFamily="2" charset="2"/>
+              <a:buChar char="§"/>
+            </a:pPr>
+            <a:r>
+              <a:rPr lang="pt-BR" sz="1320" dirty="0">
+                <a:solidFill>
+                  <a:schemeClr val="tx1"/>
+                </a:solidFill>
+                <a:latin typeface="Exo 2 Medium" panose="00000600000000000000" pitchFamily="50" charset="0"/>
+                <a:cs typeface="Simplon BP Regular"/>
+              </a:rPr>
+              <a:t>Conclusão do mapa de Empatia </a:t>
+            </a:r>
+            <a:r>
+              <a:rPr lang="pt-BR" sz="1320" b="1" dirty="0">
+                <a:solidFill>
+                  <a:schemeClr val="tx1"/>
+                </a:solidFill>
+                <a:latin typeface="Exo 2 Medium" panose="00000600000000000000" pitchFamily="50" charset="0"/>
+                <a:cs typeface="Simplon BP Regular"/>
+              </a:rPr>
+              <a:t>#Equipe</a:t>
+            </a:r>
+          </a:p>
+          <a:p>
+            <a:pPr marL="0" lvl="1" indent="-252049">
+              <a:buFont typeface="Wingdings" panose="05000000000000000000" pitchFamily="2" charset="2"/>
+              <a:buChar char="§"/>
+            </a:pPr>
+            <a:r>
+              <a:rPr lang="pt-BR" sz="1320" dirty="0">
+                <a:solidFill>
+                  <a:schemeClr val="tx1"/>
+                </a:solidFill>
+                <a:latin typeface="Exo 2 Medium" panose="00000600000000000000" pitchFamily="50" charset="0"/>
+                <a:cs typeface="Simplon BP Regular"/>
+              </a:rPr>
+              <a:t>Inicio da Jornada de Usuário </a:t>
+            </a:r>
+            <a:r>
+              <a:rPr lang="pt-BR" sz="1320" b="1" dirty="0">
+                <a:solidFill>
+                  <a:schemeClr val="tx1"/>
+                </a:solidFill>
+                <a:latin typeface="Exo 2 Medium" panose="00000600000000000000" pitchFamily="50" charset="0"/>
+                <a:cs typeface="Simplon BP Regular"/>
+              </a:rPr>
+              <a:t>#Equipe </a:t>
+            </a:r>
+          </a:p>
+          <a:p>
+            <a:pPr marL="0" lvl="1" indent="-252049">
+              <a:buFont typeface="Wingdings" panose="05000000000000000000" pitchFamily="2" charset="2"/>
+              <a:buChar char="§"/>
+            </a:pPr>
+            <a:r>
+              <a:rPr lang="pt-BR" sz="1320" dirty="0">
+                <a:solidFill>
+                  <a:schemeClr val="tx1"/>
+                </a:solidFill>
+                <a:latin typeface="Exo 2 Medium" panose="00000600000000000000" pitchFamily="50" charset="0"/>
+                <a:cs typeface="Simplon BP Regular"/>
+              </a:rPr>
+              <a:t>Ajustes nas </a:t>
+            </a:r>
+            <a:r>
+              <a:rPr lang="pt-BR" sz="1320" dirty="0" err="1">
+                <a:solidFill>
+                  <a:schemeClr val="tx1"/>
+                </a:solidFill>
+                <a:latin typeface="Exo 2 Medium" panose="00000600000000000000" pitchFamily="50" charset="0"/>
+                <a:cs typeface="Simplon BP Regular"/>
+              </a:rPr>
+              <a:t>Protopersonas</a:t>
+            </a:r>
+            <a:r>
+              <a:rPr lang="pt-BR" sz="1320" dirty="0">
+                <a:solidFill>
+                  <a:schemeClr val="tx1"/>
+                </a:solidFill>
+                <a:latin typeface="Exo 2 Medium" panose="00000600000000000000" pitchFamily="50" charset="0"/>
+                <a:cs typeface="Simplon BP Regular"/>
+              </a:rPr>
+              <a:t> #Ferraz</a:t>
+            </a:r>
+          </a:p>
+          <a:p>
+            <a:pPr marL="0" lvl="1" indent="-252049">
+              <a:buFont typeface="Wingdings" panose="05000000000000000000" pitchFamily="2" charset="2"/>
+              <a:buChar char="§"/>
+            </a:pPr>
+            <a:r>
+              <a:rPr lang="pt-BR" sz="1320" dirty="0">
+                <a:solidFill>
+                  <a:schemeClr val="tx1"/>
+                </a:solidFill>
+                <a:latin typeface="Exo 2 Medium" panose="00000600000000000000" pitchFamily="50" charset="0"/>
+                <a:cs typeface="Simplon BP Regular"/>
+              </a:rPr>
+              <a:t>Montar a planilha de Backlog </a:t>
+            </a:r>
+            <a:r>
+              <a:rPr lang="pt-BR" sz="1320" b="1" dirty="0">
+                <a:solidFill>
+                  <a:schemeClr val="tx1"/>
+                </a:solidFill>
+                <a:latin typeface="Exo 2 Medium" panose="00000600000000000000" pitchFamily="50" charset="0"/>
+                <a:cs typeface="Simplon BP Regular"/>
+              </a:rPr>
+              <a:t>#Alvares</a:t>
+            </a:r>
+          </a:p>
+          <a:p>
+            <a:pPr marL="0" lvl="1" indent="-252049">
+              <a:buFont typeface="Wingdings" panose="05000000000000000000" pitchFamily="2" charset="2"/>
+              <a:buChar char="§"/>
+            </a:pPr>
+            <a:endParaRPr lang="pt-BR" sz="1320" dirty="0">
+              <a:solidFill>
+                <a:schemeClr val="tx1"/>
+              </a:solidFill>
+              <a:latin typeface="Exo 2 Medium" panose="00000600000000000000" pitchFamily="50" charset="0"/>
+              <a:cs typeface="Simplon BP Regular"/>
+            </a:endParaRPr>
+          </a:p>
+          <a:p>
+            <a:pPr marL="0" lvl="1" indent="-252049">
+              <a:buFont typeface="Wingdings" panose="05000000000000000000" pitchFamily="2" charset="2"/>
+              <a:buChar char="§"/>
+            </a:pPr>
+            <a:r>
+              <a:rPr lang="pt-BR" sz="1320" dirty="0">
+                <a:solidFill>
+                  <a:schemeClr val="tx1"/>
+                </a:solidFill>
+                <a:latin typeface="Exo 2 Medium" panose="00000600000000000000" pitchFamily="50" charset="0"/>
+                <a:cs typeface="Simplon BP Regular"/>
+              </a:rPr>
+              <a:t>Montar o PPT </a:t>
+            </a:r>
+            <a:r>
+              <a:rPr lang="pt-BR" sz="1320" b="1" dirty="0">
+                <a:solidFill>
+                  <a:schemeClr val="tx1"/>
+                </a:solidFill>
+                <a:latin typeface="Exo 2 Medium" panose="00000600000000000000" pitchFamily="50" charset="0"/>
+                <a:cs typeface="Simplon BP Regular"/>
+              </a:rPr>
+              <a:t>#Pedro</a:t>
+            </a:r>
+          </a:p>
+          <a:p>
+            <a:pPr marL="0" lvl="1" indent="-252049">
+              <a:buFont typeface="Wingdings" panose="05000000000000000000" pitchFamily="2" charset="2"/>
+              <a:buChar char="§"/>
+            </a:pPr>
+            <a:endParaRPr lang="pt-BR" sz="1320" b="1" dirty="0">
+              <a:solidFill>
+                <a:schemeClr val="tx1"/>
+              </a:solidFill>
+              <a:latin typeface="Exo 2 Medium" panose="00000600000000000000" pitchFamily="50" charset="0"/>
+              <a:cs typeface="Simplon BP Regular"/>
+            </a:endParaRPr>
+          </a:p>
+          <a:p>
+            <a:pPr marL="0" lvl="1" indent="-252049">
+              <a:buFont typeface="Wingdings" panose="05000000000000000000" pitchFamily="2" charset="2"/>
+              <a:buChar char="§"/>
+            </a:pPr>
+            <a:endParaRPr lang="pt-BR" sz="1320" b="1" dirty="0">
+              <a:solidFill>
+                <a:schemeClr val="tx1"/>
+              </a:solidFill>
+              <a:latin typeface="Exo 2 Medium" panose="00000600000000000000" pitchFamily="50" charset="0"/>
+              <a:cs typeface="Simplon BP Regular"/>
+            </a:endParaRPr>
+          </a:p>
+          <a:p>
+            <a:pPr marL="0" lvl="1"/>
+            <a:endParaRPr lang="pt-BR" sz="1320" b="1" dirty="0">
+              <a:solidFill>
+                <a:schemeClr val="tx1"/>
+              </a:solidFill>
+              <a:latin typeface="Exo 2 Medium" panose="00000600000000000000" pitchFamily="50" charset="0"/>
+              <a:cs typeface="Simplon BP Regular"/>
+            </a:endParaRPr>
+          </a:p>
+        </p:txBody>
+      </p:sp>
+      <p:sp>
+        <p:nvSpPr>
+          <p:cNvPr id="6" name="Oval 134">
+            <a:extLst>
+              <a:ext uri="{FF2B5EF4-FFF2-40B4-BE49-F238E27FC236}">
+                <a16:creationId xmlns:a16="http://schemas.microsoft.com/office/drawing/2014/main" id="{70825C6F-9257-4CF5-8C62-1CA1EB2F8815}"/>
+              </a:ext>
+            </a:extLst>
+          </p:cNvPr>
+          <p:cNvSpPr>
+            <a:spLocks noChangeAspect="1"/>
+          </p:cNvSpPr>
+          <p:nvPr/>
+        </p:nvSpPr>
+        <p:spPr>
+          <a:xfrm>
+            <a:off x="9225955" y="297930"/>
+            <a:ext cx="211404" cy="211689"/>
+          </a:xfrm>
+          <a:prstGeom prst="ellipse">
+            <a:avLst/>
+          </a:prstGeom>
+          <a:solidFill>
+            <a:srgbClr val="FFFF00"/>
+          </a:solidFill>
+          <a:ln w="12700">
+            <a:solidFill>
+              <a:schemeClr val="accent3"/>
+            </a:solidFill>
+          </a:ln>
+        </p:spPr>
+        <p:style>
+          <a:lnRef idx="2">
+            <a:schemeClr val="accent1">
+              <a:shade val="50000"/>
+            </a:schemeClr>
+          </a:lnRef>
+          <a:fillRef idx="1">
+            <a:schemeClr val="accent1"/>
+          </a:fillRef>
+          <a:effectRef idx="0">
+            <a:schemeClr val="accent1"/>
+          </a:effectRef>
+          <a:fontRef idx="minor">
+            <a:schemeClr val="lt1"/>
+          </a:fontRef>
+        </p:style>
+        <p:txBody>
+          <a:bodyPr wrap="none" lIns="52922" tIns="52922" rIns="52922" rtlCol="0" anchor="ctr"/>
+          <a:lstStyle/>
+          <a:p>
+            <a:pPr algn="ctr" defTabSz="672130"/>
+            <a:endParaRPr lang="en-US" sz="1176" dirty="0">
+              <a:solidFill>
+                <a:prstClr val="black"/>
+              </a:solidFill>
+              <a:highlight>
+                <a:srgbClr val="FFFF00"/>
+              </a:highlight>
+              <a:latin typeface="Exo 2 Medium" panose="00000600000000000000" pitchFamily="50" charset="0"/>
+              <a:cs typeface="Simplon BP Regular"/>
+            </a:endParaRPr>
+          </a:p>
+        </p:txBody>
+      </p:sp>
+      <p:sp>
+        <p:nvSpPr>
+          <p:cNvPr id="9" name="Oval 134">
+            <a:extLst>
+              <a:ext uri="{FF2B5EF4-FFF2-40B4-BE49-F238E27FC236}">
+                <a16:creationId xmlns:a16="http://schemas.microsoft.com/office/drawing/2014/main" id="{B60B13C9-0C70-4C0F-82B2-D0CD4FDFC1F0}"/>
+              </a:ext>
+            </a:extLst>
+          </p:cNvPr>
+          <p:cNvSpPr>
+            <a:spLocks noChangeAspect="1"/>
+          </p:cNvSpPr>
+          <p:nvPr/>
+        </p:nvSpPr>
+        <p:spPr>
+          <a:xfrm>
+            <a:off x="12155999" y="297930"/>
+            <a:ext cx="211404" cy="211689"/>
+          </a:xfrm>
+          <a:prstGeom prst="ellipse">
+            <a:avLst/>
+          </a:prstGeom>
+          <a:solidFill>
+            <a:srgbClr val="FFFF00"/>
+          </a:solidFill>
+          <a:ln w="12700">
+            <a:solidFill>
+              <a:schemeClr val="accent3"/>
+            </a:solidFill>
+          </a:ln>
+        </p:spPr>
+        <p:style>
+          <a:lnRef idx="2">
+            <a:schemeClr val="accent1">
+              <a:shade val="50000"/>
+            </a:schemeClr>
+          </a:lnRef>
+          <a:fillRef idx="1">
+            <a:schemeClr val="accent1"/>
+          </a:fillRef>
+          <a:effectRef idx="0">
+            <a:schemeClr val="accent1"/>
+          </a:effectRef>
+          <a:fontRef idx="minor">
+            <a:schemeClr val="lt1"/>
+          </a:fontRef>
+        </p:style>
+        <p:txBody>
+          <a:bodyPr wrap="none" lIns="52922" tIns="52922" rIns="52922" rtlCol="0" anchor="ctr"/>
+          <a:lstStyle/>
+          <a:p>
+            <a:pPr algn="ctr" defTabSz="672130"/>
+            <a:endParaRPr lang="en-US" sz="1176" dirty="0">
+              <a:solidFill>
+                <a:prstClr val="black"/>
+              </a:solidFill>
+              <a:latin typeface="Exo 2 Medium" panose="00000600000000000000" pitchFamily="50" charset="0"/>
+              <a:cs typeface="Simplon BP Regular"/>
+            </a:endParaRPr>
+          </a:p>
+        </p:txBody>
+      </p:sp>
+      <p:sp>
+        <p:nvSpPr>
+          <p:cNvPr id="44" name="Oval 120">
+            <a:extLst>
+              <a:ext uri="{FF2B5EF4-FFF2-40B4-BE49-F238E27FC236}">
+                <a16:creationId xmlns:a16="http://schemas.microsoft.com/office/drawing/2014/main" id="{2688D066-DD5D-4246-B846-8AD1218C78EC}"/>
+              </a:ext>
+            </a:extLst>
+          </p:cNvPr>
+          <p:cNvSpPr>
+            <a:spLocks noChangeAspect="1"/>
+          </p:cNvSpPr>
+          <p:nvPr/>
+        </p:nvSpPr>
+        <p:spPr>
+          <a:xfrm>
+            <a:off x="10188056" y="297930"/>
+            <a:ext cx="211404" cy="211689"/>
+          </a:xfrm>
+          <a:prstGeom prst="ellipse">
+            <a:avLst/>
+          </a:prstGeom>
+          <a:solidFill>
+            <a:srgbClr val="FFFF00"/>
+          </a:solidFill>
+          <a:ln w="12700">
+            <a:solidFill>
+              <a:schemeClr val="accent3"/>
+            </a:solidFill>
+          </a:ln>
+        </p:spPr>
+        <p:style>
+          <a:lnRef idx="2">
+            <a:schemeClr val="accent1">
+              <a:shade val="50000"/>
+            </a:schemeClr>
+          </a:lnRef>
+          <a:fillRef idx="1">
+            <a:schemeClr val="accent1"/>
+          </a:fillRef>
+          <a:effectRef idx="0">
+            <a:schemeClr val="accent1"/>
+          </a:effectRef>
+          <a:fontRef idx="minor">
+            <a:schemeClr val="lt1"/>
+          </a:fontRef>
+        </p:style>
+        <p:txBody>
+          <a:bodyPr wrap="none" lIns="52922" tIns="52922" rIns="52922" rtlCol="0" anchor="ctr"/>
+          <a:lstStyle/>
+          <a:p>
+            <a:pPr algn="ctr" defTabSz="672130"/>
+            <a:endParaRPr lang="en-US" sz="1176" dirty="0">
+              <a:solidFill>
+                <a:prstClr val="black"/>
+              </a:solidFill>
+              <a:latin typeface="Exo 2 Medium" panose="00000600000000000000" pitchFamily="50" charset="0"/>
+              <a:cs typeface="Simplon BP Regular"/>
+            </a:endParaRPr>
+          </a:p>
+        </p:txBody>
+      </p:sp>
+      <p:sp>
+        <p:nvSpPr>
+          <p:cNvPr id="5" name="Retângulo 4">
+            <a:extLst>
+              <a:ext uri="{FF2B5EF4-FFF2-40B4-BE49-F238E27FC236}">
+                <a16:creationId xmlns:a16="http://schemas.microsoft.com/office/drawing/2014/main" id="{A1C14918-6027-46B3-96BF-C5F7FDEC3276}"/>
+              </a:ext>
+            </a:extLst>
+          </p:cNvPr>
+          <p:cNvSpPr/>
+          <p:nvPr/>
+        </p:nvSpPr>
+        <p:spPr>
+          <a:xfrm>
+            <a:off x="8017619" y="209534"/>
+            <a:ext cx="4937689" cy="618769"/>
+          </a:xfrm>
+          <a:prstGeom prst="rect">
+            <a:avLst/>
+          </a:prstGeom>
+          <a:noFill/>
+          <a:ln w="6350">
+            <a:solidFill>
+              <a:schemeClr val="bg1">
+                <a:lumMod val="75000"/>
+              </a:schemeClr>
+            </a:solidFill>
+          </a:ln>
+        </p:spPr>
+        <p:style>
+          <a:lnRef idx="2">
+            <a:schemeClr val="accent1">
+              <a:shade val="50000"/>
+            </a:schemeClr>
+          </a:lnRef>
+          <a:fillRef idx="1">
+            <a:schemeClr val="accent1"/>
+          </a:fillRef>
+          <a:effectRef idx="0">
+            <a:schemeClr val="accent1"/>
+          </a:effectRef>
+          <a:fontRef idx="minor">
+            <a:schemeClr val="lt1"/>
+          </a:fontRef>
+        </p:style>
+        <p:txBody>
+          <a:bodyPr rtlCol="0" anchor="ctr"/>
+          <a:lstStyle/>
+          <a:p>
+            <a:pPr algn="ctr"/>
+            <a:endParaRPr lang="pt-BR">
+              <a:latin typeface="Exo 2 Medium" panose="00000600000000000000" pitchFamily="50" charset="0"/>
+            </a:endParaRPr>
+          </a:p>
+        </p:txBody>
+      </p:sp>
+      <p:sp>
+        <p:nvSpPr>
+          <p:cNvPr id="8" name="TextBox 138">
+            <a:extLst>
+              <a:ext uri="{FF2B5EF4-FFF2-40B4-BE49-F238E27FC236}">
+                <a16:creationId xmlns:a16="http://schemas.microsoft.com/office/drawing/2014/main" id="{5CE7D08C-795B-4BF1-97F6-F9773F4E9F4C}"/>
+              </a:ext>
+            </a:extLst>
+          </p:cNvPr>
+          <p:cNvSpPr txBox="1"/>
+          <p:nvPr/>
+        </p:nvSpPr>
+        <p:spPr>
+          <a:xfrm>
+            <a:off x="9715810" y="51570"/>
+            <a:ext cx="1478088" cy="211688"/>
+          </a:xfrm>
+          <a:prstGeom prst="rect">
+            <a:avLst/>
+          </a:prstGeom>
+          <a:solidFill>
+            <a:schemeClr val="bg1"/>
+          </a:solidFill>
+          <a:ln w="12700">
+            <a:noFill/>
+          </a:ln>
+        </p:spPr>
+        <p:style>
+          <a:lnRef idx="2">
+            <a:schemeClr val="accent4"/>
+          </a:lnRef>
+          <a:fillRef idx="1">
+            <a:schemeClr val="lt1"/>
+          </a:fillRef>
+          <a:effectRef idx="0">
+            <a:schemeClr val="accent4"/>
+          </a:effectRef>
+          <a:fontRef idx="minor">
+            <a:schemeClr val="dk1"/>
+          </a:fontRef>
+        </p:style>
+        <p:txBody>
+          <a:bodyPr wrap="none" lIns="52922" tIns="52922" rIns="52922" bIns="0" rtlCol="0" anchor="b"/>
+          <a:lstStyle>
+            <a:defPPr>
+              <a:defRPr lang="en-US"/>
+            </a:defPPr>
+            <a:lvl1pPr algn="ctr">
+              <a:defRPr sz="1000" b="1">
+                <a:latin typeface="Simplon BP Regular"/>
+                <a:cs typeface="Simplon BP Regular"/>
+              </a:defRPr>
+            </a:lvl1pPr>
+            <a:lvl2pPr>
+              <a:defRPr>
+                <a:solidFill>
+                  <a:schemeClr val="dk1"/>
+                </a:solidFill>
+              </a:defRPr>
+            </a:lvl2pPr>
+            <a:lvl3pPr>
+              <a:defRPr>
+                <a:solidFill>
+                  <a:schemeClr val="dk1"/>
+                </a:solidFill>
+              </a:defRPr>
+            </a:lvl3pPr>
+            <a:lvl4pPr>
+              <a:defRPr>
+                <a:solidFill>
+                  <a:schemeClr val="dk1"/>
+                </a:solidFill>
+              </a:defRPr>
+            </a:lvl4pPr>
+            <a:lvl5pPr>
+              <a:defRPr>
+                <a:solidFill>
+                  <a:schemeClr val="dk1"/>
+                </a:solidFill>
+              </a:defRPr>
+            </a:lvl5pPr>
+            <a:lvl6pPr>
+              <a:defRPr>
+                <a:solidFill>
+                  <a:schemeClr val="dk1"/>
+                </a:solidFill>
+              </a:defRPr>
+            </a:lvl6pPr>
+            <a:lvl7pPr>
+              <a:defRPr>
+                <a:solidFill>
+                  <a:schemeClr val="dk1"/>
+                </a:solidFill>
+              </a:defRPr>
+            </a:lvl7pPr>
+            <a:lvl8pPr>
+              <a:defRPr>
+                <a:solidFill>
+                  <a:schemeClr val="dk1"/>
+                </a:solidFill>
+              </a:defRPr>
+            </a:lvl8pPr>
+            <a:lvl9pPr>
+              <a:defRPr>
+                <a:solidFill>
+                  <a:schemeClr val="dk1"/>
+                </a:solidFill>
+              </a:defRPr>
+            </a:lvl9pPr>
+          </a:lstStyle>
+          <a:p>
+            <a:pPr defTabSz="672130"/>
+            <a:r>
+              <a:rPr lang="en-US" sz="1176" b="0" dirty="0">
+                <a:solidFill>
+                  <a:prstClr val="black"/>
+                </a:solidFill>
+                <a:latin typeface="Exo 2 Medium" panose="00000600000000000000" pitchFamily="50" charset="0"/>
+              </a:rPr>
+              <a:t>    Farol do Projeto   </a:t>
+            </a:r>
+          </a:p>
+        </p:txBody>
+      </p:sp>
+    </p:spTree>
+    <p:extLst>
+      <p:ext uri="{BB962C8B-B14F-4D97-AF65-F5344CB8AC3E}">
+        <p14:creationId xmlns:p14="http://schemas.microsoft.com/office/powerpoint/2010/main" val="381058533"/>
       </p:ext>
     </p:extLst>
   </p:cSld>
@@ -26514,21 +28811,6 @@
 </file>
 
 <file path=customXml/item1.xml><?xml version="1.0" encoding="utf-8"?>
-<?mso-contentType ?>
-<FormTemplates xmlns="http://schemas.microsoft.com/sharepoint/v3/contenttype/forms">
-  <Display>DocumentLibraryForm</Display>
-  <Edit>DocumentLibraryForm</Edit>
-  <New>DocumentLibraryForm</New>
-</FormTemplates>
-</file>
-
-<file path=customXml/item2.xml><?xml version="1.0" encoding="utf-8"?>
-<p:properties xmlns:p="http://schemas.microsoft.com/office/2006/metadata/properties" xmlns:xsi="http://www.w3.org/2001/XMLSchema-instance" xmlns:pc="http://schemas.microsoft.com/office/infopath/2007/PartnerControls">
-  <documentManagement/>
-</p:properties>
-</file>
-
-<file path=customXml/item3.xml><?xml version="1.0" encoding="utf-8"?>
 <ct:contentTypeSchema xmlns:ct="http://schemas.microsoft.com/office/2006/metadata/contentType" xmlns:ma="http://schemas.microsoft.com/office/2006/metadata/properties/metaAttributes" ct:_="" ma:_="" ma:contentTypeName="Document" ma:contentTypeID="0x0101007F8ECE7139958D46ABEDA89D12B90CBF" ma:contentTypeVersion="0" ma:contentTypeDescription="Create a new document." ma:contentTypeScope="" ma:versionID="e6d660081116f63565d30cc13099d5ec">
   <xsd:schema xmlns:xsd="http://www.w3.org/2001/XMLSchema" xmlns:xs="http://www.w3.org/2001/XMLSchema" xmlns:p="http://schemas.microsoft.com/office/2006/metadata/properties" targetNamespace="http://schemas.microsoft.com/office/2006/metadata/properties" ma:root="true" ma:fieldsID="d413257cd9829394d17656a545d5fa4e">
     <xsd:element name="properties">
@@ -26642,10 +28924,33 @@
 </ct:contentTypeSchema>
 </file>
 
+<file path=customXml/item2.xml><?xml version="1.0" encoding="utf-8"?>
+<p:properties xmlns:p="http://schemas.microsoft.com/office/2006/metadata/properties" xmlns:xsi="http://www.w3.org/2001/XMLSchema-instance" xmlns:pc="http://schemas.microsoft.com/office/infopath/2007/PartnerControls">
+  <documentManagement/>
+</p:properties>
+</file>
+
+<file path=customXml/item3.xml><?xml version="1.0" encoding="utf-8"?>
+<?mso-contentType ?>
+<FormTemplates xmlns="http://schemas.microsoft.com/sharepoint/v3/contenttype/forms">
+  <Display>DocumentLibraryForm</Display>
+  <Edit>DocumentLibraryForm</Edit>
+  <New>DocumentLibraryForm</New>
+</FormTemplates>
+</file>
+
 <file path=customXml/itemProps1.xml><?xml version="1.0" encoding="utf-8"?>
-<ds:datastoreItem xmlns:ds="http://schemas.openxmlformats.org/officeDocument/2006/customXml" ds:itemID="{E2481852-F24E-4532-AF30-C154D705D105}">
+<ds:datastoreItem xmlns:ds="http://schemas.openxmlformats.org/officeDocument/2006/customXml" ds:itemID="{EFDE92A4-5D2A-451A-A373-EB014CDC0D59}">
   <ds:schemaRefs>
-    <ds:schemaRef ds:uri="http://schemas.microsoft.com/sharepoint/v3/contenttype/forms"/>
+    <ds:schemaRef ds:uri="http://schemas.microsoft.com/office/2006/metadata/contentType"/>
+    <ds:schemaRef ds:uri="http://schemas.microsoft.com/office/2006/metadata/properties/metaAttributes"/>
+    <ds:schemaRef ds:uri="http://www.w3.org/2001/XMLSchema"/>
+    <ds:schemaRef ds:uri="http://schemas.microsoft.com/office/2006/metadata/properties"/>
+    <ds:schemaRef ds:uri="http://schemas.openxmlformats.org/package/2006/metadata/core-properties"/>
+    <ds:schemaRef ds:uri="http://purl.org/dc/elements/1.1/"/>
+    <ds:schemaRef ds:uri="http://purl.org/dc/terms/"/>
+    <ds:schemaRef ds:uri="http://schemas.microsoft.com/internal/obd"/>
+    <ds:schemaRef ds:uri="http://schemas.microsoft.com/office/infopath/2007/PartnerControls"/>
   </ds:schemaRefs>
 </ds:datastoreItem>
 </file>
@@ -26668,17 +28973,9 @@
 </file>
 
 <file path=customXml/itemProps3.xml><?xml version="1.0" encoding="utf-8"?>
-<ds:datastoreItem xmlns:ds="http://schemas.openxmlformats.org/officeDocument/2006/customXml" ds:itemID="{EFDE92A4-5D2A-451A-A373-EB014CDC0D59}">
+<ds:datastoreItem xmlns:ds="http://schemas.openxmlformats.org/officeDocument/2006/customXml" ds:itemID="{E2481852-F24E-4532-AF30-C154D705D105}">
   <ds:schemaRefs>
-    <ds:schemaRef ds:uri="http://schemas.microsoft.com/office/2006/metadata/contentType"/>
-    <ds:schemaRef ds:uri="http://schemas.microsoft.com/office/2006/metadata/properties/metaAttributes"/>
-    <ds:schemaRef ds:uri="http://www.w3.org/2001/XMLSchema"/>
-    <ds:schemaRef ds:uri="http://schemas.microsoft.com/office/2006/metadata/properties"/>
-    <ds:schemaRef ds:uri="http://schemas.openxmlformats.org/package/2006/metadata/core-properties"/>
-    <ds:schemaRef ds:uri="http://purl.org/dc/elements/1.1/"/>
-    <ds:schemaRef ds:uri="http://purl.org/dc/terms/"/>
-    <ds:schemaRef ds:uri="http://schemas.microsoft.com/internal/obd"/>
-    <ds:schemaRef ds:uri="http://schemas.microsoft.com/office/infopath/2007/PartnerControls"/>
+    <ds:schemaRef ds:uri="http://schemas.microsoft.com/sharepoint/v3/contenttype/forms"/>
   </ds:schemaRefs>
 </ds:datastoreItem>
 </file>
</xml_diff>